<commit_message>
docs(apresentacao): atualizar apresentacao v6
Co-Authored-By: Claude Opus 4.6 <noreply@anthropic.com>
</commit_message>
<xml_diff>
--- a/APRESENTACAO_CURSO_IA_ADVOCACIA_v6.pptx
+++ b/APRESENTACAO_CURSO_IA_ADVOCACIA_v6.pptx
@@ -3375,8 +3375,8 @@
         </p:blipFill>
         <p:spPr>
           <a:xfrm>
-            <a:off x="9875520" y="5029200"/>
-            <a:ext cx="1188720" cy="1188720"/>
+            <a:off x="9601200" y="4572000"/>
+            <a:ext cx="1828800" cy="1828800"/>
           </a:xfrm>
           <a:prstGeom prst="rect">
             <a:avLst/>
@@ -6872,8 +6872,8 @@
         </p:blipFill>
         <p:spPr>
           <a:xfrm>
-            <a:off x="9601200" y="4754880"/>
-            <a:ext cx="1097280" cy="1097280"/>
+            <a:off x="9418320" y="4389120"/>
+            <a:ext cx="1828800" cy="1828800"/>
           </a:xfrm>
           <a:prstGeom prst="rect">
             <a:avLst/>
@@ -14996,8 +14996,8 @@
         </p:blipFill>
         <p:spPr>
           <a:xfrm>
-            <a:off x="9601200" y="4114800"/>
-            <a:ext cx="1371600" cy="1371600"/>
+            <a:off x="9326880" y="3840480"/>
+            <a:ext cx="2011680" cy="2011680"/>
           </a:xfrm>
           <a:prstGeom prst="rect">
             <a:avLst/>
@@ -15476,8 +15476,8 @@
         </p:blipFill>
         <p:spPr>
           <a:xfrm>
-            <a:off x="9875520" y="4572000"/>
-            <a:ext cx="1371600" cy="1371600"/>
+            <a:off x="9326880" y="4114800"/>
+            <a:ext cx="2011680" cy="2011680"/>
           </a:xfrm>
           <a:prstGeom prst="rect">
             <a:avLst/>
@@ -16397,8 +16397,8 @@
         </p:blipFill>
         <p:spPr>
           <a:xfrm>
-            <a:off x="1280160" y="5029200"/>
-            <a:ext cx="1005840" cy="1005840"/>
+            <a:off x="1645920" y="4754880"/>
+            <a:ext cx="1463040" cy="1463040"/>
           </a:xfrm>
           <a:prstGeom prst="rect">
             <a:avLst/>
@@ -16421,8 +16421,8 @@
         </p:blipFill>
         <p:spPr>
           <a:xfrm>
-            <a:off x="5029200" y="5029200"/>
-            <a:ext cx="1005840" cy="1005840"/>
+            <a:off x="5394960" y="4754880"/>
+            <a:ext cx="1463040" cy="1463040"/>
           </a:xfrm>
           <a:prstGeom prst="rect">
             <a:avLst/>
@@ -16445,8 +16445,8 @@
         </p:blipFill>
         <p:spPr>
           <a:xfrm>
-            <a:off x="8778240" y="5029200"/>
-            <a:ext cx="1005840" cy="1005840"/>
+            <a:off x="9144000" y="4754880"/>
+            <a:ext cx="1463040" cy="1463040"/>
           </a:xfrm>
           <a:prstGeom prst="rect">
             <a:avLst/>

</xml_diff>